<commit_message>
Added github link to powerpoint
</commit_message>
<xml_diff>
--- a/Unity-Lunch-n-learn.pptx
+++ b/Unity-Lunch-n-learn.pptx
@@ -111,6 +111,27 @@
       </a:defRPr>
     </a:lvl9pPr>
   </p:defaultTextStyle>
+  <p:extLst>
+    <p:ext uri="{521415D9-36F7-43E2-AB2F-B90AF26B5E84}">
+      <p14:sectionLst xmlns:p14="http://schemas.microsoft.com/office/powerpoint/2010/main">
+        <p14:section name="Untitled Section" id="{C136918D-8750-43A5-8D89-02DC64200D7B}">
+          <p14:sldIdLst>
+            <p14:sldId id="256"/>
+            <p14:sldId id="257"/>
+            <p14:sldId id="258"/>
+            <p14:sldId id="259"/>
+            <p14:sldId id="261"/>
+            <p14:sldId id="260"/>
+            <p14:sldId id="263"/>
+            <p14:sldId id="262"/>
+          </p14:sldIdLst>
+        </p14:section>
+      </p14:sectionLst>
+    </p:ext>
+    <p:ext uri="{EFAFB233-063F-42B5-8137-9DF3F51BA10A}">
+      <p15:sldGuideLst xmlns:p15="http://schemas.microsoft.com/office/powerpoint/2012/main"/>
+    </p:ext>
+  </p:extLst>
 </p:presentation>
 </file>
 
@@ -171,7 +192,7 @@
           <a:noFill/>
           <a:extLst>
             <a:ext uri="{909E8E84-426E-40dd-AFC4-6F175D3DCCD1}">
-              <a14:hiddenFill xmlns:a14="http://schemas.microsoft.com/office/drawing/2010/main" xmlns="">
+              <a14:hiddenFill xmlns="" xmlns:a14="http://schemas.microsoft.com/office/drawing/2010/main">
                 <a:solidFill>
                   <a:srgbClr val="FFFFFF"/>
                 </a:solidFill>
@@ -230,7 +251,7 @@
             </a:ln>
             <a:extLst>
               <a:ext uri="{91240B29-F687-4f45-9708-019B960494DF}">
-                <a14:hiddenLine xmlns:a14="http://schemas.microsoft.com/office/drawing/2010/main" xmlns="" w="9525">
+                <a14:hiddenLine xmlns="" xmlns:a14="http://schemas.microsoft.com/office/drawing/2010/main" w="9525">
                   <a:solidFill>
                     <a:srgbClr val="000000"/>
                   </a:solidFill>
@@ -320,7 +341,7 @@
             </a:ln>
             <a:extLst>
               <a:ext uri="{91240B29-F687-4f45-9708-019B960494DF}">
-                <a14:hiddenLine xmlns:a14="http://schemas.microsoft.com/office/drawing/2010/main" xmlns="" w="9525">
+                <a14:hiddenLine xmlns="" xmlns:a14="http://schemas.microsoft.com/office/drawing/2010/main" w="9525">
                   <a:solidFill>
                     <a:srgbClr val="000000"/>
                   </a:solidFill>
@@ -410,7 +431,7 @@
             </a:ln>
             <a:extLst>
               <a:ext uri="{91240B29-F687-4f45-9708-019B960494DF}">
-                <a14:hiddenLine xmlns:a14="http://schemas.microsoft.com/office/drawing/2010/main" xmlns="" w="9525">
+                <a14:hiddenLine xmlns="" xmlns:a14="http://schemas.microsoft.com/office/drawing/2010/main" w="9525">
                   <a:solidFill>
                     <a:srgbClr val="000000"/>
                   </a:solidFill>
@@ -444,7 +465,7 @@
             </a:ln>
             <a:extLst>
               <a:ext uri="{91240B29-F687-4f45-9708-019B960494DF}">
-                <a14:hiddenLine xmlns:a14="http://schemas.microsoft.com/office/drawing/2010/main" xmlns="" w="9525">
+                <a14:hiddenLine xmlns="" xmlns:a14="http://schemas.microsoft.com/office/drawing/2010/main" w="9525">
                   <a:solidFill>
                     <a:srgbClr val="000000"/>
                   </a:solidFill>
@@ -534,7 +555,7 @@
             </a:ln>
             <a:extLst>
               <a:ext uri="{91240B29-F687-4f45-9708-019B960494DF}">
-                <a14:hiddenLine xmlns:a14="http://schemas.microsoft.com/office/drawing/2010/main" xmlns="" w="9525">
+                <a14:hiddenLine xmlns="" xmlns:a14="http://schemas.microsoft.com/office/drawing/2010/main" w="9525">
                   <a:solidFill>
                     <a:srgbClr val="000000"/>
                   </a:solidFill>
@@ -596,7 +617,7 @@
             </a:ln>
             <a:extLst>
               <a:ext uri="{91240B29-F687-4f45-9708-019B960494DF}">
-                <a14:hiddenLine xmlns:a14="http://schemas.microsoft.com/office/drawing/2010/main" xmlns="" w="9525">
+                <a14:hiddenLine xmlns="" xmlns:a14="http://schemas.microsoft.com/office/drawing/2010/main" w="9525">
                   <a:solidFill>
                     <a:srgbClr val="000000"/>
                   </a:solidFill>
@@ -658,7 +679,7 @@
             </a:ln>
             <a:extLst>
               <a:ext uri="{91240B29-F687-4f45-9708-019B960494DF}">
-                <a14:hiddenLine xmlns:a14="http://schemas.microsoft.com/office/drawing/2010/main" xmlns="" w="9525">
+                <a14:hiddenLine xmlns="" xmlns:a14="http://schemas.microsoft.com/office/drawing/2010/main" w="9525">
                   <a:solidFill>
                     <a:srgbClr val="000000"/>
                   </a:solidFill>
@@ -748,7 +769,7 @@
             </a:ln>
             <a:extLst>
               <a:ext uri="{91240B29-F687-4f45-9708-019B960494DF}">
-                <a14:hiddenLine xmlns:a14="http://schemas.microsoft.com/office/drawing/2010/main" xmlns="" w="9525">
+                <a14:hiddenLine xmlns="" xmlns:a14="http://schemas.microsoft.com/office/drawing/2010/main" w="9525">
                   <a:solidFill>
                     <a:srgbClr val="000000"/>
                   </a:solidFill>
@@ -810,7 +831,7 @@
             </a:ln>
             <a:extLst>
               <a:ext uri="{91240B29-F687-4f45-9708-019B960494DF}">
-                <a14:hiddenLine xmlns:a14="http://schemas.microsoft.com/office/drawing/2010/main" xmlns="" w="9525">
+                <a14:hiddenLine xmlns="" xmlns:a14="http://schemas.microsoft.com/office/drawing/2010/main" w="9525">
                   <a:solidFill>
                     <a:srgbClr val="000000"/>
                   </a:solidFill>
@@ -872,7 +893,7 @@
             </a:ln>
             <a:extLst>
               <a:ext uri="{91240B29-F687-4f45-9708-019B960494DF}">
-                <a14:hiddenLine xmlns:a14="http://schemas.microsoft.com/office/drawing/2010/main" xmlns="" w="9525">
+                <a14:hiddenLine xmlns="" xmlns:a14="http://schemas.microsoft.com/office/drawing/2010/main" w="9525">
                   <a:solidFill>
                     <a:srgbClr val="000000"/>
                   </a:solidFill>
@@ -962,7 +983,7 @@
             </a:ln>
             <a:extLst>
               <a:ext uri="{91240B29-F687-4f45-9708-019B960494DF}">
-                <a14:hiddenLine xmlns:a14="http://schemas.microsoft.com/office/drawing/2010/main" xmlns="" w="9525">
+                <a14:hiddenLine xmlns="" xmlns:a14="http://schemas.microsoft.com/office/drawing/2010/main" w="9525">
                   <a:solidFill>
                     <a:srgbClr val="000000"/>
                   </a:solidFill>
@@ -1052,7 +1073,7 @@
             </a:ln>
             <a:extLst>
               <a:ext uri="{91240B29-F687-4f45-9708-019B960494DF}">
-                <a14:hiddenLine xmlns:a14="http://schemas.microsoft.com/office/drawing/2010/main" xmlns="" w="9525">
+                <a14:hiddenLine xmlns="" xmlns:a14="http://schemas.microsoft.com/office/drawing/2010/main" w="9525">
                   <a:solidFill>
                     <a:srgbClr val="000000"/>
                   </a:solidFill>
@@ -1114,7 +1135,7 @@
             </a:ln>
             <a:extLst>
               <a:ext uri="{91240B29-F687-4f45-9708-019B960494DF}">
-                <a14:hiddenLine xmlns:a14="http://schemas.microsoft.com/office/drawing/2010/main" xmlns="" w="9525">
+                <a14:hiddenLine xmlns="" xmlns:a14="http://schemas.microsoft.com/office/drawing/2010/main" w="9525">
                   <a:solidFill>
                     <a:srgbClr val="000000"/>
                   </a:solidFill>
@@ -1224,7 +1245,7 @@
             </a:ln>
             <a:extLst>
               <a:ext uri="{91240B29-F687-4f45-9708-019B960494DF}">
-                <a14:hiddenLine xmlns:a14="http://schemas.microsoft.com/office/drawing/2010/main" xmlns="" w="9525">
+                <a14:hiddenLine xmlns="" xmlns:a14="http://schemas.microsoft.com/office/drawing/2010/main" w="9525">
                   <a:solidFill>
                     <a:srgbClr val="000000"/>
                   </a:solidFill>
@@ -1286,7 +1307,7 @@
             </a:ln>
             <a:extLst>
               <a:ext uri="{91240B29-F687-4f45-9708-019B960494DF}">
-                <a14:hiddenLine xmlns:a14="http://schemas.microsoft.com/office/drawing/2010/main" xmlns="" w="9525">
+                <a14:hiddenLine xmlns="" xmlns:a14="http://schemas.microsoft.com/office/drawing/2010/main" w="9525">
                   <a:solidFill>
                     <a:srgbClr val="000000"/>
                   </a:solidFill>
@@ -1376,7 +1397,7 @@
             </a:ln>
             <a:extLst>
               <a:ext uri="{91240B29-F687-4f45-9708-019B960494DF}">
-                <a14:hiddenLine xmlns:a14="http://schemas.microsoft.com/office/drawing/2010/main" xmlns="" w="9525">
+                <a14:hiddenLine xmlns="" xmlns:a14="http://schemas.microsoft.com/office/drawing/2010/main" w="9525">
                   <a:solidFill>
                     <a:srgbClr val="000000"/>
                   </a:solidFill>
@@ -1466,7 +1487,7 @@
             </a:ln>
             <a:extLst>
               <a:ext uri="{91240B29-F687-4f45-9708-019B960494DF}">
-                <a14:hiddenLine xmlns:a14="http://schemas.microsoft.com/office/drawing/2010/main" xmlns="" w="9525">
+                <a14:hiddenLine xmlns="" xmlns:a14="http://schemas.microsoft.com/office/drawing/2010/main" w="9525">
                   <a:solidFill>
                     <a:srgbClr val="000000"/>
                   </a:solidFill>
@@ -1528,7 +1549,7 @@
             </a:ln>
             <a:extLst>
               <a:ext uri="{91240B29-F687-4f45-9708-019B960494DF}">
-                <a14:hiddenLine xmlns:a14="http://schemas.microsoft.com/office/drawing/2010/main" xmlns="" w="9525">
+                <a14:hiddenLine xmlns="" xmlns:a14="http://schemas.microsoft.com/office/drawing/2010/main" w="9525">
                   <a:solidFill>
                     <a:srgbClr val="000000"/>
                   </a:solidFill>
@@ -1618,7 +1639,7 @@
             </a:ln>
             <a:extLst>
               <a:ext uri="{91240B29-F687-4f45-9708-019B960494DF}">
-                <a14:hiddenLine xmlns:a14="http://schemas.microsoft.com/office/drawing/2010/main" xmlns="" w="9525">
+                <a14:hiddenLine xmlns="" xmlns:a14="http://schemas.microsoft.com/office/drawing/2010/main" w="9525">
                   <a:solidFill>
                     <a:srgbClr val="000000"/>
                   </a:solidFill>
@@ -1708,7 +1729,7 @@
             </a:ln>
             <a:extLst>
               <a:ext uri="{91240B29-F687-4f45-9708-019B960494DF}">
-                <a14:hiddenLine xmlns:a14="http://schemas.microsoft.com/office/drawing/2010/main" xmlns="" w="9525">
+                <a14:hiddenLine xmlns="" xmlns:a14="http://schemas.microsoft.com/office/drawing/2010/main" w="9525">
                   <a:solidFill>
                     <a:srgbClr val="000000"/>
                   </a:solidFill>
@@ -1764,7 +1785,7 @@
             </a:ln>
             <a:extLst>
               <a:ext uri="{91240B29-F687-4f45-9708-019B960494DF}">
-                <a14:hiddenLine xmlns:a14="http://schemas.microsoft.com/office/drawing/2010/main" xmlns="" w="9525">
+                <a14:hiddenLine xmlns="" xmlns:a14="http://schemas.microsoft.com/office/drawing/2010/main" w="9525">
                   <a:solidFill>
                     <a:srgbClr val="000000"/>
                   </a:solidFill>
@@ -1854,7 +1875,7 @@
             </a:ln>
             <a:extLst>
               <a:ext uri="{91240B29-F687-4f45-9708-019B960494DF}">
-                <a14:hiddenLine xmlns:a14="http://schemas.microsoft.com/office/drawing/2010/main" xmlns="" w="9525">
+                <a14:hiddenLine xmlns="" xmlns:a14="http://schemas.microsoft.com/office/drawing/2010/main" w="9525">
                   <a:solidFill>
                     <a:srgbClr val="000000"/>
                   </a:solidFill>
@@ -1910,7 +1931,7 @@
             </a:ln>
             <a:extLst>
               <a:ext uri="{91240B29-F687-4f45-9708-019B960494DF}">
-                <a14:hiddenLine xmlns:a14="http://schemas.microsoft.com/office/drawing/2010/main" xmlns="" w="9525">
+                <a14:hiddenLine xmlns="" xmlns:a14="http://schemas.microsoft.com/office/drawing/2010/main" w="9525">
                   <a:solidFill>
                     <a:srgbClr val="000000"/>
                   </a:solidFill>
@@ -2000,7 +2021,7 @@
             </a:ln>
             <a:extLst>
               <a:ext uri="{91240B29-F687-4f45-9708-019B960494DF}">
-                <a14:hiddenLine xmlns:a14="http://schemas.microsoft.com/office/drawing/2010/main" xmlns="" w="9525">
+                <a14:hiddenLine xmlns="" xmlns:a14="http://schemas.microsoft.com/office/drawing/2010/main" w="9525">
                   <a:solidFill>
                     <a:srgbClr val="000000"/>
                   </a:solidFill>
@@ -2068,7 +2089,7 @@
             </a:ln>
             <a:extLst>
               <a:ext uri="{91240B29-F687-4f45-9708-019B960494DF}">
-                <a14:hiddenLine xmlns:a14="http://schemas.microsoft.com/office/drawing/2010/main" xmlns="" w="9525">
+                <a14:hiddenLine xmlns="" xmlns:a14="http://schemas.microsoft.com/office/drawing/2010/main" w="9525">
                   <a:solidFill>
                     <a:srgbClr val="000000"/>
                   </a:solidFill>
@@ -2158,7 +2179,7 @@
             </a:ln>
             <a:extLst>
               <a:ext uri="{91240B29-F687-4f45-9708-019B960494DF}">
-                <a14:hiddenLine xmlns:a14="http://schemas.microsoft.com/office/drawing/2010/main" xmlns="" w="9525">
+                <a14:hiddenLine xmlns="" xmlns:a14="http://schemas.microsoft.com/office/drawing/2010/main" w="9525">
                   <a:solidFill>
                     <a:srgbClr val="000000"/>
                   </a:solidFill>
@@ -2226,7 +2247,7 @@
             </a:ln>
             <a:extLst>
               <a:ext uri="{91240B29-F687-4f45-9708-019B960494DF}">
-                <a14:hiddenLine xmlns:a14="http://schemas.microsoft.com/office/drawing/2010/main" xmlns="" w="9525">
+                <a14:hiddenLine xmlns="" xmlns:a14="http://schemas.microsoft.com/office/drawing/2010/main" w="9525">
                   <a:solidFill>
                     <a:srgbClr val="000000"/>
                   </a:solidFill>
@@ -2316,7 +2337,7 @@
             </a:ln>
             <a:extLst>
               <a:ext uri="{91240B29-F687-4f45-9708-019B960494DF}">
-                <a14:hiddenLine xmlns:a14="http://schemas.microsoft.com/office/drawing/2010/main" xmlns="" w="9525">
+                <a14:hiddenLine xmlns="" xmlns:a14="http://schemas.microsoft.com/office/drawing/2010/main" w="9525">
                   <a:solidFill>
                     <a:srgbClr val="000000"/>
                   </a:solidFill>
@@ -2350,7 +2371,7 @@
             </a:ln>
             <a:extLst>
               <a:ext uri="{91240B29-F687-4f45-9708-019B960494DF}">
-                <a14:hiddenLine xmlns:a14="http://schemas.microsoft.com/office/drawing/2010/main" xmlns="" w="9525">
+                <a14:hiddenLine xmlns="" xmlns:a14="http://schemas.microsoft.com/office/drawing/2010/main" w="9525">
                   <a:solidFill>
                     <a:srgbClr val="000000"/>
                   </a:solidFill>
@@ -2440,7 +2461,7 @@
             </a:ln>
             <a:extLst>
               <a:ext uri="{91240B29-F687-4f45-9708-019B960494DF}">
-                <a14:hiddenLine xmlns:a14="http://schemas.microsoft.com/office/drawing/2010/main" xmlns="" w="9525">
+                <a14:hiddenLine xmlns="" xmlns:a14="http://schemas.microsoft.com/office/drawing/2010/main" w="9525">
                   <a:solidFill>
                     <a:srgbClr val="000000"/>
                   </a:solidFill>
@@ -2502,7 +2523,7 @@
             </a:ln>
             <a:extLst>
               <a:ext uri="{91240B29-F687-4f45-9708-019B960494DF}">
-                <a14:hiddenLine xmlns:a14="http://schemas.microsoft.com/office/drawing/2010/main" xmlns="" w="9525">
+                <a14:hiddenLine xmlns="" xmlns:a14="http://schemas.microsoft.com/office/drawing/2010/main" w="9525">
                   <a:solidFill>
                     <a:srgbClr val="000000"/>
                   </a:solidFill>
@@ -2564,7 +2585,7 @@
             </a:ln>
             <a:extLst>
               <a:ext uri="{91240B29-F687-4f45-9708-019B960494DF}">
-                <a14:hiddenLine xmlns:a14="http://schemas.microsoft.com/office/drawing/2010/main" xmlns="" w="9525">
+                <a14:hiddenLine xmlns="" xmlns:a14="http://schemas.microsoft.com/office/drawing/2010/main" w="9525">
                   <a:solidFill>
                     <a:srgbClr val="000000"/>
                   </a:solidFill>
@@ -2654,7 +2675,7 @@
             </a:ln>
             <a:extLst>
               <a:ext uri="{91240B29-F687-4f45-9708-019B960494DF}">
-                <a14:hiddenLine xmlns:a14="http://schemas.microsoft.com/office/drawing/2010/main" xmlns="" w="9525">
+                <a14:hiddenLine xmlns="" xmlns:a14="http://schemas.microsoft.com/office/drawing/2010/main" w="9525">
                   <a:solidFill>
                     <a:srgbClr val="000000"/>
                   </a:solidFill>
@@ -2722,7 +2743,7 @@
             </a:ln>
             <a:extLst>
               <a:ext uri="{91240B29-F687-4f45-9708-019B960494DF}">
-                <a14:hiddenLine xmlns:a14="http://schemas.microsoft.com/office/drawing/2010/main" xmlns="" w="9525">
+                <a14:hiddenLine xmlns="" xmlns:a14="http://schemas.microsoft.com/office/drawing/2010/main" w="9525">
                   <a:solidFill>
                     <a:srgbClr val="000000"/>
                   </a:solidFill>
@@ -2784,7 +2805,7 @@
             </a:ln>
             <a:extLst>
               <a:ext uri="{91240B29-F687-4f45-9708-019B960494DF}">
-                <a14:hiddenLine xmlns:a14="http://schemas.microsoft.com/office/drawing/2010/main" xmlns="" w="9525">
+                <a14:hiddenLine xmlns="" xmlns:a14="http://schemas.microsoft.com/office/drawing/2010/main" w="9525">
                   <a:solidFill>
                     <a:srgbClr val="000000"/>
                   </a:solidFill>
@@ -2874,7 +2895,7 @@
             </a:ln>
             <a:extLst>
               <a:ext uri="{91240B29-F687-4f45-9708-019B960494DF}">
-                <a14:hiddenLine xmlns:a14="http://schemas.microsoft.com/office/drawing/2010/main" xmlns="" w="9525">
+                <a14:hiddenLine xmlns="" xmlns:a14="http://schemas.microsoft.com/office/drawing/2010/main" w="9525">
                   <a:solidFill>
                     <a:srgbClr val="000000"/>
                   </a:solidFill>
@@ -2936,7 +2957,7 @@
             </a:ln>
             <a:extLst>
               <a:ext uri="{91240B29-F687-4f45-9708-019B960494DF}">
-                <a14:hiddenLine xmlns:a14="http://schemas.microsoft.com/office/drawing/2010/main" xmlns="" w="9525">
+                <a14:hiddenLine xmlns="" xmlns:a14="http://schemas.microsoft.com/office/drawing/2010/main" w="9525">
                   <a:solidFill>
                     <a:srgbClr val="000000"/>
                   </a:solidFill>
@@ -3026,7 +3047,7 @@
             </a:ln>
             <a:extLst>
               <a:ext uri="{91240B29-F687-4f45-9708-019B960494DF}">
-                <a14:hiddenLine xmlns:a14="http://schemas.microsoft.com/office/drawing/2010/main" xmlns="" w="9525">
+                <a14:hiddenLine xmlns="" xmlns:a14="http://schemas.microsoft.com/office/drawing/2010/main" w="9525">
                   <a:solidFill>
                     <a:srgbClr val="000000"/>
                   </a:solidFill>
@@ -3088,7 +3109,7 @@
             </a:ln>
             <a:extLst>
               <a:ext uri="{91240B29-F687-4f45-9708-019B960494DF}">
-                <a14:hiddenLine xmlns:a14="http://schemas.microsoft.com/office/drawing/2010/main" xmlns="" w="9525">
+                <a14:hiddenLine xmlns="" xmlns:a14="http://schemas.microsoft.com/office/drawing/2010/main" w="9525">
                   <a:solidFill>
                     <a:srgbClr val="000000"/>
                   </a:solidFill>
@@ -3178,7 +3199,7 @@
             </a:ln>
             <a:extLst>
               <a:ext uri="{91240B29-F687-4f45-9708-019B960494DF}">
-                <a14:hiddenLine xmlns:a14="http://schemas.microsoft.com/office/drawing/2010/main" xmlns="" w="9525">
+                <a14:hiddenLine xmlns="" xmlns:a14="http://schemas.microsoft.com/office/drawing/2010/main" w="9525">
                   <a:solidFill>
                     <a:srgbClr val="000000"/>
                   </a:solidFill>
@@ -3212,7 +3233,7 @@
             </a:ln>
             <a:extLst>
               <a:ext uri="{91240B29-F687-4f45-9708-019B960494DF}">
-                <a14:hiddenLine xmlns:a14="http://schemas.microsoft.com/office/drawing/2010/main" xmlns="" w="9525">
+                <a14:hiddenLine xmlns="" xmlns:a14="http://schemas.microsoft.com/office/drawing/2010/main" w="9525">
                   <a:solidFill>
                     <a:srgbClr val="000000"/>
                   </a:solidFill>
@@ -3277,7 +3298,7 @@
             </a:ln>
             <a:extLst>
               <a:ext uri="{91240B29-F687-4f45-9708-019B960494DF}">
-                <a14:hiddenLine xmlns:a14="http://schemas.microsoft.com/office/drawing/2010/main" xmlns="" w="9525">
+                <a14:hiddenLine xmlns="" xmlns:a14="http://schemas.microsoft.com/office/drawing/2010/main" w="9525">
                   <a:solidFill>
                     <a:srgbClr val="000000"/>
                   </a:solidFill>
@@ -3367,7 +3388,7 @@
             </a:ln>
             <a:extLst>
               <a:ext uri="{91240B29-F687-4f45-9708-019B960494DF}">
-                <a14:hiddenLine xmlns:a14="http://schemas.microsoft.com/office/drawing/2010/main" xmlns="" w="9525">
+                <a14:hiddenLine xmlns="" xmlns:a14="http://schemas.microsoft.com/office/drawing/2010/main" w="9525">
                   <a:solidFill>
                     <a:srgbClr val="000000"/>
                   </a:solidFill>
@@ -3429,7 +3450,7 @@
             </a:ln>
             <a:extLst>
               <a:ext uri="{91240B29-F687-4f45-9708-019B960494DF}">
-                <a14:hiddenLine xmlns:a14="http://schemas.microsoft.com/office/drawing/2010/main" xmlns="" w="9525">
+                <a14:hiddenLine xmlns="" xmlns:a14="http://schemas.microsoft.com/office/drawing/2010/main" w="9525">
                   <a:solidFill>
                     <a:srgbClr val="000000"/>
                   </a:solidFill>
@@ -3519,7 +3540,7 @@
             </a:ln>
             <a:extLst>
               <a:ext uri="{91240B29-F687-4f45-9708-019B960494DF}">
-                <a14:hiddenLine xmlns:a14="http://schemas.microsoft.com/office/drawing/2010/main" xmlns="" w="9525">
+                <a14:hiddenLine xmlns="" xmlns:a14="http://schemas.microsoft.com/office/drawing/2010/main" w="9525">
                   <a:solidFill>
                     <a:srgbClr val="000000"/>
                   </a:solidFill>
@@ -3609,7 +3630,7 @@
             </a:ln>
             <a:extLst>
               <a:ext uri="{91240B29-F687-4f45-9708-019B960494DF}">
-                <a14:hiddenLine xmlns:a14="http://schemas.microsoft.com/office/drawing/2010/main" xmlns="" w="9525">
+                <a14:hiddenLine xmlns="" xmlns:a14="http://schemas.microsoft.com/office/drawing/2010/main" w="9525">
                   <a:solidFill>
                     <a:srgbClr val="000000"/>
                   </a:solidFill>
@@ -3674,7 +3695,7 @@
             </a:ln>
             <a:extLst>
               <a:ext uri="{91240B29-F687-4f45-9708-019B960494DF}">
-                <a14:hiddenLine xmlns:a14="http://schemas.microsoft.com/office/drawing/2010/main" xmlns="" w="9525">
+                <a14:hiddenLine xmlns="" xmlns:a14="http://schemas.microsoft.com/office/drawing/2010/main" w="9525">
                   <a:solidFill>
                     <a:srgbClr val="000000"/>
                   </a:solidFill>
@@ -3736,7 +3757,7 @@
             </a:ln>
             <a:extLst>
               <a:ext uri="{91240B29-F687-4f45-9708-019B960494DF}">
-                <a14:hiddenLine xmlns:a14="http://schemas.microsoft.com/office/drawing/2010/main" xmlns="" w="9525">
+                <a14:hiddenLine xmlns="" xmlns:a14="http://schemas.microsoft.com/office/drawing/2010/main" w="9525">
                   <a:solidFill>
                     <a:srgbClr val="000000"/>
                   </a:solidFill>
@@ -3826,7 +3847,7 @@
             </a:ln>
             <a:extLst>
               <a:ext uri="{91240B29-F687-4f45-9708-019B960494DF}">
-                <a14:hiddenLine xmlns:a14="http://schemas.microsoft.com/office/drawing/2010/main" xmlns="" w="9525">
+                <a14:hiddenLine xmlns="" xmlns:a14="http://schemas.microsoft.com/office/drawing/2010/main" w="9525">
                   <a:solidFill>
                     <a:srgbClr val="000000"/>
                   </a:solidFill>
@@ -3916,7 +3937,7 @@
             </a:ln>
             <a:extLst>
               <a:ext uri="{91240B29-F687-4f45-9708-019B960494DF}">
-                <a14:hiddenLine xmlns:a14="http://schemas.microsoft.com/office/drawing/2010/main" xmlns="" w="9525">
+                <a14:hiddenLine xmlns="" xmlns:a14="http://schemas.microsoft.com/office/drawing/2010/main" w="9525">
                   <a:solidFill>
                     <a:srgbClr val="000000"/>
                   </a:solidFill>
@@ -3978,7 +3999,7 @@
             </a:ln>
             <a:extLst>
               <a:ext uri="{91240B29-F687-4f45-9708-019B960494DF}">
-                <a14:hiddenLine xmlns:a14="http://schemas.microsoft.com/office/drawing/2010/main" xmlns="" w="9525">
+                <a14:hiddenLine xmlns="" xmlns:a14="http://schemas.microsoft.com/office/drawing/2010/main" w="9525">
                   <a:solidFill>
                     <a:srgbClr val="000000"/>
                   </a:solidFill>
@@ -4098,7 +4119,7 @@
             </a:ln>
             <a:extLst>
               <a:ext uri="{91240B29-F687-4f45-9708-019B960494DF}">
-                <a14:hiddenLine xmlns:a14="http://schemas.microsoft.com/office/drawing/2010/main" xmlns="" w="9525">
+                <a14:hiddenLine xmlns="" xmlns:a14="http://schemas.microsoft.com/office/drawing/2010/main" w="9525">
                   <a:solidFill>
                     <a:srgbClr val="000000"/>
                   </a:solidFill>
@@ -4166,7 +4187,7 @@
             </a:ln>
             <a:extLst>
               <a:ext uri="{91240B29-F687-4f45-9708-019B960494DF}">
-                <a14:hiddenLine xmlns:a14="http://schemas.microsoft.com/office/drawing/2010/main" xmlns="" w="9525">
+                <a14:hiddenLine xmlns="" xmlns:a14="http://schemas.microsoft.com/office/drawing/2010/main" w="9525">
                   <a:solidFill>
                     <a:srgbClr val="000000"/>
                   </a:solidFill>
@@ -4256,7 +4277,7 @@
             </a:ln>
             <a:extLst>
               <a:ext uri="{91240B29-F687-4f45-9708-019B960494DF}">
-                <a14:hiddenLine xmlns:a14="http://schemas.microsoft.com/office/drawing/2010/main" xmlns="" w="9525">
+                <a14:hiddenLine xmlns="" xmlns:a14="http://schemas.microsoft.com/office/drawing/2010/main" w="9525">
                   <a:solidFill>
                     <a:srgbClr val="000000"/>
                   </a:solidFill>
@@ -4396,7 +4417,7 @@
           <a:p>
             <a:fld id="{48A87A34-81AB-432B-8DAE-1953F412C126}" type="datetimeFigureOut">
               <a:rPr lang="en-US" dirty="0"/>
-              <a:t>10/15/2019</a:t>
+              <a:t>10/16/2019</a:t>
             </a:fld>
             <a:endParaRPr lang="en-US" dirty="0"/>
           </a:p>
@@ -4658,7 +4679,7 @@
           <a:p>
             <a:fld id="{48A87A34-81AB-432B-8DAE-1953F412C126}" type="datetimeFigureOut">
               <a:rPr lang="en-US" dirty="0"/>
-              <a:t>10/15/2019</a:t>
+              <a:t>10/16/2019</a:t>
             </a:fld>
             <a:endParaRPr lang="en-US" dirty="0"/>
           </a:p>
@@ -4849,7 +4870,7 @@
           <a:p>
             <a:fld id="{48A87A34-81AB-432B-8DAE-1953F412C126}" type="datetimeFigureOut">
               <a:rPr lang="en-US" dirty="0"/>
-              <a:t>10/15/2019</a:t>
+              <a:t>10/16/2019</a:t>
             </a:fld>
             <a:endParaRPr lang="en-US" dirty="0"/>
           </a:p>
@@ -5107,7 +5128,7 @@
           <a:p>
             <a:fld id="{48A87A34-81AB-432B-8DAE-1953F412C126}" type="datetimeFigureOut">
               <a:rPr lang="en-US" dirty="0"/>
-              <a:t>10/15/2019</a:t>
+              <a:t>10/16/2019</a:t>
             </a:fld>
             <a:endParaRPr lang="en-US" dirty="0"/>
           </a:p>
@@ -5536,7 +5557,7 @@
           <a:p>
             <a:fld id="{48A87A34-81AB-432B-8DAE-1953F412C126}" type="datetimeFigureOut">
               <a:rPr lang="en-US" dirty="0"/>
-              <a:t>10/15/2019</a:t>
+              <a:t>10/16/2019</a:t>
             </a:fld>
             <a:endParaRPr lang="en-US" dirty="0"/>
           </a:p>
@@ -6077,7 +6098,7 @@
           <a:p>
             <a:fld id="{48A87A34-81AB-432B-8DAE-1953F412C126}" type="datetimeFigureOut">
               <a:rPr lang="en-US" dirty="0"/>
-              <a:t>10/15/2019</a:t>
+              <a:t>10/16/2019</a:t>
             </a:fld>
             <a:endParaRPr lang="en-US" dirty="0"/>
           </a:p>
@@ -6792,7 +6813,7 @@
           <a:p>
             <a:fld id="{48A87A34-81AB-432B-8DAE-1953F412C126}" type="datetimeFigureOut">
               <a:rPr lang="en-US" dirty="0"/>
-              <a:t>10/15/2019</a:t>
+              <a:t>10/16/2019</a:t>
             </a:fld>
             <a:endParaRPr lang="en-US" dirty="0"/>
           </a:p>
@@ -6957,7 +6978,7 @@
           <a:p>
             <a:fld id="{48A87A34-81AB-432B-8DAE-1953F412C126}" type="datetimeFigureOut">
               <a:rPr lang="en-US" dirty="0"/>
-              <a:t>10/15/2019</a:t>
+              <a:t>10/16/2019</a:t>
             </a:fld>
             <a:endParaRPr lang="en-US" dirty="0"/>
           </a:p>
@@ -7132,7 +7153,7 @@
           <a:p>
             <a:fld id="{48A87A34-81AB-432B-8DAE-1953F412C126}" type="datetimeFigureOut">
               <a:rPr lang="en-US" dirty="0"/>
-              <a:t>10/15/2019</a:t>
+              <a:t>10/16/2019</a:t>
             </a:fld>
             <a:endParaRPr lang="en-US" dirty="0"/>
           </a:p>
@@ -7297,7 +7318,7 @@
           <a:p>
             <a:fld id="{48A87A34-81AB-432B-8DAE-1953F412C126}" type="datetimeFigureOut">
               <a:rPr lang="en-US" dirty="0"/>
-              <a:t>10/15/2019</a:t>
+              <a:t>10/16/2019</a:t>
             </a:fld>
             <a:endParaRPr lang="en-US" dirty="0"/>
           </a:p>
@@ -7542,7 +7563,7 @@
           <a:p>
             <a:fld id="{48A87A34-81AB-432B-8DAE-1953F412C126}" type="datetimeFigureOut">
               <a:rPr lang="en-US" dirty="0"/>
-              <a:t>10/15/2019</a:t>
+              <a:t>10/16/2019</a:t>
             </a:fld>
             <a:endParaRPr lang="en-US" dirty="0"/>
           </a:p>
@@ -7769,7 +7790,7 @@
           <a:p>
             <a:fld id="{48A87A34-81AB-432B-8DAE-1953F412C126}" type="datetimeFigureOut">
               <a:rPr lang="en-US" dirty="0"/>
-              <a:t>10/15/2019</a:t>
+              <a:t>10/16/2019</a:t>
             </a:fld>
             <a:endParaRPr lang="en-US" dirty="0"/>
           </a:p>
@@ -8145,7 +8166,7 @@
           <a:p>
             <a:fld id="{48A87A34-81AB-432B-8DAE-1953F412C126}" type="datetimeFigureOut">
               <a:rPr lang="en-US" dirty="0"/>
-              <a:t>10/15/2019</a:t>
+              <a:t>10/16/2019</a:t>
             </a:fld>
             <a:endParaRPr lang="en-US" dirty="0"/>
           </a:p>
@@ -8258,7 +8279,7 @@
           <a:p>
             <a:fld id="{48A87A34-81AB-432B-8DAE-1953F412C126}" type="datetimeFigureOut">
               <a:rPr lang="en-US" dirty="0"/>
-              <a:t>10/15/2019</a:t>
+              <a:t>10/16/2019</a:t>
             </a:fld>
             <a:endParaRPr lang="en-US" dirty="0"/>
           </a:p>
@@ -8348,7 +8369,7 @@
           <a:p>
             <a:fld id="{48A87A34-81AB-432B-8DAE-1953F412C126}" type="datetimeFigureOut">
               <a:rPr lang="en-US" dirty="0"/>
-              <a:t>10/15/2019</a:t>
+              <a:t>10/16/2019</a:t>
             </a:fld>
             <a:endParaRPr lang="en-US" dirty="0"/>
           </a:p>
@@ -8592,7 +8613,7 @@
           <a:p>
             <a:fld id="{48A87A34-81AB-432B-8DAE-1953F412C126}" type="datetimeFigureOut">
               <a:rPr lang="en-US" dirty="0"/>
-              <a:t>10/15/2019</a:t>
+              <a:t>10/16/2019</a:t>
             </a:fld>
             <a:endParaRPr lang="en-US" dirty="0"/>
           </a:p>
@@ -8867,7 +8888,7 @@
           <a:p>
             <a:fld id="{48A87A34-81AB-432B-8DAE-1953F412C126}" type="datetimeFigureOut">
               <a:rPr lang="en-US" dirty="0"/>
-              <a:t>10/15/2019</a:t>
+              <a:t>10/16/2019</a:t>
             </a:fld>
             <a:endParaRPr lang="en-US" dirty="0"/>
           </a:p>
@@ -8985,7 +9006,7 @@
           <a:noFill/>
           <a:extLst>
             <a:ext uri="{909E8E84-426E-40dd-AFC4-6F175D3DCCD1}">
-              <a14:hiddenFill xmlns:a14="http://schemas.microsoft.com/office/drawing/2010/main" xmlns="">
+              <a14:hiddenFill xmlns="" xmlns:a14="http://schemas.microsoft.com/office/drawing/2010/main">
                 <a:solidFill>
                   <a:srgbClr val="FFFFFF"/>
                 </a:solidFill>
@@ -9059,7 +9080,7 @@
               </a:ln>
               <a:extLst>
                 <a:ext uri="{91240B29-F687-4f45-9708-019B960494DF}">
-                  <a14:hiddenLine xmlns:a14="http://schemas.microsoft.com/office/drawing/2010/main" xmlns="" w="9525">
+                  <a14:hiddenLine xmlns="" xmlns:a14="http://schemas.microsoft.com/office/drawing/2010/main" w="9525">
                     <a:solidFill>
                       <a:srgbClr val="000000"/>
                     </a:solidFill>
@@ -9149,7 +9170,7 @@
               </a:ln>
               <a:extLst>
                 <a:ext uri="{91240B29-F687-4f45-9708-019B960494DF}">
-                  <a14:hiddenLine xmlns:a14="http://schemas.microsoft.com/office/drawing/2010/main" xmlns="" w="9525">
+                  <a14:hiddenLine xmlns="" xmlns:a14="http://schemas.microsoft.com/office/drawing/2010/main" w="9525">
                     <a:solidFill>
                       <a:srgbClr val="000000"/>
                     </a:solidFill>
@@ -9239,7 +9260,7 @@
               </a:ln>
               <a:extLst>
                 <a:ext uri="{91240B29-F687-4f45-9708-019B960494DF}">
-                  <a14:hiddenLine xmlns:a14="http://schemas.microsoft.com/office/drawing/2010/main" xmlns="" w="9525">
+                  <a14:hiddenLine xmlns="" xmlns:a14="http://schemas.microsoft.com/office/drawing/2010/main" w="9525">
                     <a:solidFill>
                       <a:srgbClr val="000000"/>
                     </a:solidFill>
@@ -9301,7 +9322,7 @@
               </a:ln>
               <a:extLst>
                 <a:ext uri="{91240B29-F687-4f45-9708-019B960494DF}">
-                  <a14:hiddenLine xmlns:a14="http://schemas.microsoft.com/office/drawing/2010/main" xmlns="" w="9525">
+                  <a14:hiddenLine xmlns="" xmlns:a14="http://schemas.microsoft.com/office/drawing/2010/main" w="9525">
                     <a:solidFill>
                       <a:srgbClr val="000000"/>
                     </a:solidFill>
@@ -9391,7 +9412,7 @@
               </a:ln>
               <a:extLst>
                 <a:ext uri="{91240B29-F687-4f45-9708-019B960494DF}">
-                  <a14:hiddenLine xmlns:a14="http://schemas.microsoft.com/office/drawing/2010/main" xmlns="" w="9525">
+                  <a14:hiddenLine xmlns="" xmlns:a14="http://schemas.microsoft.com/office/drawing/2010/main" w="9525">
                     <a:solidFill>
                       <a:srgbClr val="000000"/>
                     </a:solidFill>
@@ -9453,7 +9474,7 @@
               </a:ln>
               <a:extLst>
                 <a:ext uri="{91240B29-F687-4f45-9708-019B960494DF}">
-                  <a14:hiddenLine xmlns:a14="http://schemas.microsoft.com/office/drawing/2010/main" xmlns="" w="9525">
+                  <a14:hiddenLine xmlns="" xmlns:a14="http://schemas.microsoft.com/office/drawing/2010/main" w="9525">
                     <a:solidFill>
                       <a:srgbClr val="000000"/>
                     </a:solidFill>
@@ -9515,7 +9536,7 @@
               </a:ln>
               <a:extLst>
                 <a:ext uri="{91240B29-F687-4f45-9708-019B960494DF}">
-                  <a14:hiddenLine xmlns:a14="http://schemas.microsoft.com/office/drawing/2010/main" xmlns="" w="9525">
+                  <a14:hiddenLine xmlns="" xmlns:a14="http://schemas.microsoft.com/office/drawing/2010/main" w="9525">
                     <a:solidFill>
                       <a:srgbClr val="000000"/>
                     </a:solidFill>
@@ -9605,7 +9626,7 @@
               </a:ln>
               <a:extLst>
                 <a:ext uri="{91240B29-F687-4f45-9708-019B960494DF}">
-                  <a14:hiddenLine xmlns:a14="http://schemas.microsoft.com/office/drawing/2010/main" xmlns="" w="9525">
+                  <a14:hiddenLine xmlns="" xmlns:a14="http://schemas.microsoft.com/office/drawing/2010/main" w="9525">
                     <a:solidFill>
                       <a:srgbClr val="000000"/>
                     </a:solidFill>
@@ -9695,7 +9716,7 @@
               </a:ln>
               <a:extLst>
                 <a:ext uri="{91240B29-F687-4f45-9708-019B960494DF}">
-                  <a14:hiddenLine xmlns:a14="http://schemas.microsoft.com/office/drawing/2010/main" xmlns="" w="9525">
+                  <a14:hiddenLine xmlns="" xmlns:a14="http://schemas.microsoft.com/office/drawing/2010/main" w="9525">
                     <a:solidFill>
                       <a:srgbClr val="000000"/>
                     </a:solidFill>
@@ -9757,7 +9778,7 @@
               </a:ln>
               <a:extLst>
                 <a:ext uri="{91240B29-F687-4f45-9708-019B960494DF}">
-                  <a14:hiddenLine xmlns:a14="http://schemas.microsoft.com/office/drawing/2010/main" xmlns="" w="9525">
+                  <a14:hiddenLine xmlns="" xmlns:a14="http://schemas.microsoft.com/office/drawing/2010/main" w="9525">
                     <a:solidFill>
                       <a:srgbClr val="000000"/>
                     </a:solidFill>
@@ -9867,7 +9888,7 @@
               </a:ln>
               <a:extLst>
                 <a:ext uri="{91240B29-F687-4f45-9708-019B960494DF}">
-                  <a14:hiddenLine xmlns:a14="http://schemas.microsoft.com/office/drawing/2010/main" xmlns="" w="9525">
+                  <a14:hiddenLine xmlns="" xmlns:a14="http://schemas.microsoft.com/office/drawing/2010/main" w="9525">
                     <a:solidFill>
                       <a:srgbClr val="000000"/>
                     </a:solidFill>
@@ -9951,7 +9972,7 @@
               </a:ln>
               <a:extLst>
                 <a:ext uri="{91240B29-F687-4f45-9708-019B960494DF}">
-                  <a14:hiddenLine xmlns:a14="http://schemas.microsoft.com/office/drawing/2010/main" xmlns="" w="9525">
+                  <a14:hiddenLine xmlns="" xmlns:a14="http://schemas.microsoft.com/office/drawing/2010/main" w="9525">
                     <a:solidFill>
                       <a:srgbClr val="000000"/>
                     </a:solidFill>
@@ -10013,7 +10034,7 @@
               </a:ln>
               <a:extLst>
                 <a:ext uri="{91240B29-F687-4f45-9708-019B960494DF}">
-                  <a14:hiddenLine xmlns:a14="http://schemas.microsoft.com/office/drawing/2010/main" xmlns="" w="9525">
+                  <a14:hiddenLine xmlns="" xmlns:a14="http://schemas.microsoft.com/office/drawing/2010/main" w="9525">
                     <a:solidFill>
                       <a:srgbClr val="000000"/>
                     </a:solidFill>
@@ -10075,7 +10096,7 @@
               </a:ln>
               <a:extLst>
                 <a:ext uri="{91240B29-F687-4f45-9708-019B960494DF}">
-                  <a14:hiddenLine xmlns:a14="http://schemas.microsoft.com/office/drawing/2010/main" xmlns="" w="9525">
+                  <a14:hiddenLine xmlns="" xmlns:a14="http://schemas.microsoft.com/office/drawing/2010/main" w="9525">
                     <a:solidFill>
                       <a:srgbClr val="000000"/>
                     </a:solidFill>
@@ -10165,7 +10186,7 @@
               </a:ln>
               <a:extLst>
                 <a:ext uri="{91240B29-F687-4f45-9708-019B960494DF}">
-                  <a14:hiddenLine xmlns:a14="http://schemas.microsoft.com/office/drawing/2010/main" xmlns="" w="9525">
+                  <a14:hiddenLine xmlns="" xmlns:a14="http://schemas.microsoft.com/office/drawing/2010/main" w="9525">
                     <a:solidFill>
                       <a:srgbClr val="000000"/>
                     </a:solidFill>
@@ -10199,7 +10220,7 @@
               </a:ln>
               <a:extLst>
                 <a:ext uri="{91240B29-F687-4f45-9708-019B960494DF}">
-                  <a14:hiddenLine xmlns:a14="http://schemas.microsoft.com/office/drawing/2010/main" xmlns="" w="9525">
+                  <a14:hiddenLine xmlns="" xmlns:a14="http://schemas.microsoft.com/office/drawing/2010/main" w="9525">
                     <a:solidFill>
                       <a:srgbClr val="000000"/>
                     </a:solidFill>
@@ -10264,7 +10285,7 @@
               </a:ln>
               <a:extLst>
                 <a:ext uri="{91240B29-F687-4f45-9708-019B960494DF}">
-                  <a14:hiddenLine xmlns:a14="http://schemas.microsoft.com/office/drawing/2010/main" xmlns="" w="9525">
+                  <a14:hiddenLine xmlns="" xmlns:a14="http://schemas.microsoft.com/office/drawing/2010/main" w="9525">
                     <a:solidFill>
                       <a:srgbClr val="000000"/>
                     </a:solidFill>
@@ -10354,7 +10375,7 @@
               </a:ln>
               <a:extLst>
                 <a:ext uri="{91240B29-F687-4f45-9708-019B960494DF}">
-                  <a14:hiddenLine xmlns:a14="http://schemas.microsoft.com/office/drawing/2010/main" xmlns="" w="9525">
+                  <a14:hiddenLine xmlns="" xmlns:a14="http://schemas.microsoft.com/office/drawing/2010/main" w="9525">
                     <a:solidFill>
                       <a:srgbClr val="000000"/>
                     </a:solidFill>
@@ -10416,7 +10437,7 @@
               </a:ln>
               <a:extLst>
                 <a:ext uri="{91240B29-F687-4f45-9708-019B960494DF}">
-                  <a14:hiddenLine xmlns:a14="http://schemas.microsoft.com/office/drawing/2010/main" xmlns="" w="9525">
+                  <a14:hiddenLine xmlns="" xmlns:a14="http://schemas.microsoft.com/office/drawing/2010/main" w="9525">
                     <a:solidFill>
                       <a:srgbClr val="000000"/>
                     </a:solidFill>
@@ -10506,7 +10527,7 @@
               </a:ln>
               <a:extLst>
                 <a:ext uri="{91240B29-F687-4f45-9708-019B960494DF}">
-                  <a14:hiddenLine xmlns:a14="http://schemas.microsoft.com/office/drawing/2010/main" xmlns="" w="9525">
+                  <a14:hiddenLine xmlns="" xmlns:a14="http://schemas.microsoft.com/office/drawing/2010/main" w="9525">
                     <a:solidFill>
                       <a:srgbClr val="000000"/>
                     </a:solidFill>
@@ -10571,7 +10592,7 @@
               </a:ln>
               <a:extLst>
                 <a:ext uri="{91240B29-F687-4f45-9708-019B960494DF}">
-                  <a14:hiddenLine xmlns:a14="http://schemas.microsoft.com/office/drawing/2010/main" xmlns="" w="9525">
+                  <a14:hiddenLine xmlns="" xmlns:a14="http://schemas.microsoft.com/office/drawing/2010/main" w="9525">
                     <a:solidFill>
                       <a:srgbClr val="000000"/>
                     </a:solidFill>
@@ -10633,7 +10654,7 @@
               </a:ln>
               <a:extLst>
                 <a:ext uri="{91240B29-F687-4f45-9708-019B960494DF}">
-                  <a14:hiddenLine xmlns:a14="http://schemas.microsoft.com/office/drawing/2010/main" xmlns="" w="9525">
+                  <a14:hiddenLine xmlns="" xmlns:a14="http://schemas.microsoft.com/office/drawing/2010/main" w="9525">
                     <a:solidFill>
                       <a:srgbClr val="000000"/>
                     </a:solidFill>
@@ -10723,7 +10744,7 @@
               </a:ln>
               <a:extLst>
                 <a:ext uri="{91240B29-F687-4f45-9708-019B960494DF}">
-                  <a14:hiddenLine xmlns:a14="http://schemas.microsoft.com/office/drawing/2010/main" xmlns="" w="9525">
+                  <a14:hiddenLine xmlns="" xmlns:a14="http://schemas.microsoft.com/office/drawing/2010/main" w="9525">
                     <a:solidFill>
                       <a:srgbClr val="000000"/>
                     </a:solidFill>
@@ -10813,7 +10834,7 @@
               </a:ln>
               <a:extLst>
                 <a:ext uri="{91240B29-F687-4f45-9708-019B960494DF}">
-                  <a14:hiddenLine xmlns:a14="http://schemas.microsoft.com/office/drawing/2010/main" xmlns="" w="9525">
+                  <a14:hiddenLine xmlns="" xmlns:a14="http://schemas.microsoft.com/office/drawing/2010/main" w="9525">
                     <a:solidFill>
                       <a:srgbClr val="000000"/>
                     </a:solidFill>
@@ -10878,7 +10899,7 @@
               </a:ln>
               <a:extLst>
                 <a:ext uri="{91240B29-F687-4f45-9708-019B960494DF}">
-                  <a14:hiddenLine xmlns:a14="http://schemas.microsoft.com/office/drawing/2010/main" xmlns="" w="9525">
+                  <a14:hiddenLine xmlns="" xmlns:a14="http://schemas.microsoft.com/office/drawing/2010/main" w="9525">
                     <a:solidFill>
                       <a:srgbClr val="000000"/>
                     </a:solidFill>
@@ -10998,7 +11019,7 @@
               </a:ln>
               <a:extLst>
                 <a:ext uri="{91240B29-F687-4f45-9708-019B960494DF}">
-                  <a14:hiddenLine xmlns:a14="http://schemas.microsoft.com/office/drawing/2010/main" xmlns="" w="9525">
+                  <a14:hiddenLine xmlns="" xmlns:a14="http://schemas.microsoft.com/office/drawing/2010/main" w="9525">
                     <a:solidFill>
                       <a:srgbClr val="000000"/>
                     </a:solidFill>
@@ -11079,7 +11100,7 @@
               </a:ln>
               <a:extLst>
                 <a:ext uri="{91240B29-F687-4f45-9708-019B960494DF}">
-                  <a14:hiddenLine xmlns:a14="http://schemas.microsoft.com/office/drawing/2010/main" xmlns="" w="9525">
+                  <a14:hiddenLine xmlns="" xmlns:a14="http://schemas.microsoft.com/office/drawing/2010/main" w="9525">
                     <a:solidFill>
                       <a:srgbClr val="000000"/>
                     </a:solidFill>
@@ -11194,7 +11215,7 @@
               </a:ln>
               <a:extLst>
                 <a:ext uri="{91240B29-F687-4f45-9708-019B960494DF}">
-                  <a14:hiddenLine xmlns:a14="http://schemas.microsoft.com/office/drawing/2010/main" xmlns="" w="9525">
+                  <a14:hiddenLine xmlns="" xmlns:a14="http://schemas.microsoft.com/office/drawing/2010/main" w="9525">
                     <a:solidFill>
                       <a:srgbClr val="000000"/>
                     </a:solidFill>
@@ -11284,7 +11305,7 @@
               </a:ln>
               <a:extLst>
                 <a:ext uri="{91240B29-F687-4f45-9708-019B960494DF}">
-                  <a14:hiddenLine xmlns:a14="http://schemas.microsoft.com/office/drawing/2010/main" xmlns="" w="9525">
+                  <a14:hiddenLine xmlns="" xmlns:a14="http://schemas.microsoft.com/office/drawing/2010/main" w="9525">
                     <a:solidFill>
                       <a:srgbClr val="000000"/>
                     </a:solidFill>
@@ -11349,7 +11370,7 @@
               </a:ln>
               <a:extLst>
                 <a:ext uri="{91240B29-F687-4f45-9708-019B960494DF}">
-                  <a14:hiddenLine xmlns:a14="http://schemas.microsoft.com/office/drawing/2010/main" xmlns="" w="9525">
+                  <a14:hiddenLine xmlns="" xmlns:a14="http://schemas.microsoft.com/office/drawing/2010/main" w="9525">
                     <a:solidFill>
                       <a:srgbClr val="000000"/>
                     </a:solidFill>
@@ -11439,7 +11460,7 @@
               </a:ln>
               <a:extLst>
                 <a:ext uri="{91240B29-F687-4f45-9708-019B960494DF}">
-                  <a14:hiddenLine xmlns:a14="http://schemas.microsoft.com/office/drawing/2010/main" xmlns="" w="9525">
+                  <a14:hiddenLine xmlns="" xmlns:a14="http://schemas.microsoft.com/office/drawing/2010/main" w="9525">
                     <a:solidFill>
                       <a:srgbClr val="000000"/>
                     </a:solidFill>
@@ -11507,7 +11528,7 @@
               </a:ln>
               <a:extLst>
                 <a:ext uri="{91240B29-F687-4f45-9708-019B960494DF}">
-                  <a14:hiddenLine xmlns:a14="http://schemas.microsoft.com/office/drawing/2010/main" xmlns="" w="9525">
+                  <a14:hiddenLine xmlns="" xmlns:a14="http://schemas.microsoft.com/office/drawing/2010/main" w="9525">
                     <a:solidFill>
                       <a:srgbClr val="000000"/>
                     </a:solidFill>
@@ -11597,7 +11618,7 @@
               </a:ln>
               <a:extLst>
                 <a:ext uri="{91240B29-F687-4f45-9708-019B960494DF}">
-                  <a14:hiddenLine xmlns:a14="http://schemas.microsoft.com/office/drawing/2010/main" xmlns="" w="9525">
+                  <a14:hiddenLine xmlns="" xmlns:a14="http://schemas.microsoft.com/office/drawing/2010/main" w="9525">
                     <a:solidFill>
                       <a:srgbClr val="000000"/>
                     </a:solidFill>
@@ -11665,7 +11686,7 @@
               </a:ln>
               <a:extLst>
                 <a:ext uri="{91240B29-F687-4f45-9708-019B960494DF}">
-                  <a14:hiddenLine xmlns:a14="http://schemas.microsoft.com/office/drawing/2010/main" xmlns="" w="9525">
+                  <a14:hiddenLine xmlns="" xmlns:a14="http://schemas.microsoft.com/office/drawing/2010/main" w="9525">
                     <a:solidFill>
                       <a:srgbClr val="000000"/>
                     </a:solidFill>
@@ -11755,7 +11776,7 @@
               </a:ln>
               <a:extLst>
                 <a:ext uri="{91240B29-F687-4f45-9708-019B960494DF}">
-                  <a14:hiddenLine xmlns:a14="http://schemas.microsoft.com/office/drawing/2010/main" xmlns="" w="9525">
+                  <a14:hiddenLine xmlns="" xmlns:a14="http://schemas.microsoft.com/office/drawing/2010/main" w="9525">
                     <a:solidFill>
                       <a:srgbClr val="000000"/>
                     </a:solidFill>
@@ -11789,7 +11810,7 @@
               </a:ln>
               <a:extLst>
                 <a:ext uri="{91240B29-F687-4f45-9708-019B960494DF}">
-                  <a14:hiddenLine xmlns:a14="http://schemas.microsoft.com/office/drawing/2010/main" xmlns="" w="9525">
+                  <a14:hiddenLine xmlns="" xmlns:a14="http://schemas.microsoft.com/office/drawing/2010/main" w="9525">
                     <a:solidFill>
                       <a:srgbClr val="000000"/>
                     </a:solidFill>
@@ -11930,7 +11951,7 @@
             <a:fld id="{48A87A34-81AB-432B-8DAE-1953F412C126}" type="datetimeFigureOut">
               <a:rPr lang="en-US" dirty="0"/>
               <a:pPr/>
-              <a:t>10/15/2019</a:t>
+              <a:t>10/16/2019</a:t>
             </a:fld>
             <a:endParaRPr lang="en-US" dirty="0"/>
           </a:p>
@@ -12381,6 +12402,44 @@
           </a:p>
         </p:txBody>
       </p:sp>
+      <p:sp>
+        <p:nvSpPr>
+          <p:cNvPr id="3" name="TextBox 2">
+            <a:extLst>
+              <a:ext uri="{FF2B5EF4-FFF2-40B4-BE49-F238E27FC236}">
+                <a16:creationId xmlns:a16="http://schemas.microsoft.com/office/drawing/2014/main" id="{10D06818-D65E-44CB-9238-AD361E6B5CF6}"/>
+              </a:ext>
+            </a:extLst>
+          </p:cNvPr>
+          <p:cNvSpPr txBox="1"/>
+          <p:nvPr/>
+        </p:nvSpPr>
+        <p:spPr>
+          <a:xfrm>
+            <a:off x="1876424" y="4104733"/>
+            <a:ext cx="6426200" cy="369332"/>
+          </a:xfrm>
+          <a:prstGeom prst="rect">
+            <a:avLst/>
+          </a:prstGeom>
+          <a:noFill/>
+        </p:spPr>
+        <p:txBody>
+          <a:bodyPr wrap="square" rtlCol="0">
+            <a:spAutoFit/>
+          </a:bodyPr>
+          <a:lstStyle/>
+          <a:p>
+            <a:r>
+              <a:rPr lang="en-US" dirty="0">
+                <a:hlinkClick r:id="rId2"/>
+              </a:rPr>
+              <a:t>https://github.com/MatHuf/UnityLunchAndLearn</a:t>
+            </a:r>
+            <a:endParaRPr lang="en-US" dirty="0"/>
+          </a:p>
+        </p:txBody>
+      </p:sp>
     </p:spTree>
     <p:extLst>
       <p:ext uri="{BB962C8B-B14F-4D97-AF65-F5344CB8AC3E}">

</xml_diff>